<commit_message>
Dernière Maj des planches
</commit_message>
<xml_diff>
--- a/Diapos/High_Performance_Computing_Intro.pptx
+++ b/Diapos/High_Performance_Computing_Intro.pptx
@@ -5,26 +5,27 @@
     <p:sldMasterId id="2147483648" r:id="rId4"/>
   </p:sldMasterIdLst>
   <p:notesMasterIdLst>
-    <p:notesMasterId r:id="rId14"/>
+    <p:notesMasterId r:id="rId15"/>
   </p:notesMasterIdLst>
   <p:handoutMasterIdLst>
-    <p:handoutMasterId r:id="rId15"/>
+    <p:handoutMasterId r:id="rId16"/>
   </p:handoutMasterIdLst>
   <p:sldIdLst>
     <p:sldId id="654" r:id="rId5"/>
     <p:sldId id="658" r:id="rId6"/>
     <p:sldId id="680" r:id="rId7"/>
     <p:sldId id="660" r:id="rId8"/>
-    <p:sldId id="664" r:id="rId9"/>
-    <p:sldId id="659" r:id="rId10"/>
-    <p:sldId id="683" r:id="rId11"/>
-    <p:sldId id="682" r:id="rId12"/>
-    <p:sldId id="684" r:id="rId13"/>
+    <p:sldId id="685" r:id="rId9"/>
+    <p:sldId id="664" r:id="rId10"/>
+    <p:sldId id="659" r:id="rId11"/>
+    <p:sldId id="683" r:id="rId12"/>
+    <p:sldId id="682" r:id="rId13"/>
+    <p:sldId id="684" r:id="rId14"/>
   </p:sldIdLst>
   <p:sldSz cx="12192000" cy="6858000"/>
   <p:notesSz cx="6858000" cy="9144000"/>
   <p:custDataLst>
-    <p:tags r:id="rId16"/>
+    <p:tags r:id="rId17"/>
   </p:custDataLst>
   <p:defaultTextStyle>
     <a:defPPr>
@@ -130,6 +131,7 @@
             <p14:sldId id="658"/>
             <p14:sldId id="680"/>
             <p14:sldId id="660"/>
+            <p14:sldId id="685"/>
             <p14:sldId id="664"/>
             <p14:sldId id="659"/>
             <p14:sldId id="683"/>
@@ -167,13 +169,121 @@
 <file path=ppt/revisionInfo.xml><?xml version="1.0" encoding="utf-8"?>
 <p1510:revInfo xmlns:a="http://schemas.openxmlformats.org/drawingml/2006/main" xmlns:r="http://schemas.openxmlformats.org/officeDocument/2006/relationships" xmlns:p1510="http://schemas.microsoft.com/office/powerpoint/2015/10/main">
   <p1510:revLst>
-    <p1510:client id="{F1BA8389-3F93-470F-AFA0-F0A8A5BCAADE}" v="234" dt="2023-10-03T13:03:22.369"/>
+    <p1510:client id="{FF542AF4-D00B-4673-B758-E97A0BA79889}" v="1" dt="2023-10-10T19:25:49.995"/>
   </p1510:revLst>
 </p1510:revInfo>
 </file>
 
 <file path=ppt/changesInfos/changesInfo1.xml><?xml version="1.0" encoding="utf-8"?>
 <pc:chgInfo xmlns:a="http://schemas.openxmlformats.org/drawingml/2006/main" xmlns:r="http://schemas.openxmlformats.org/officeDocument/2006/relationships" xmlns:ac="http://schemas.microsoft.com/office/drawing/2013/main/command" xmlns:pc="http://schemas.microsoft.com/office/powerpoint/2013/main/command">
+  <pc:docChgLst>
+    <pc:chgData name="GINGUENE Franck" userId="6dd02597-da63-4c42-a4ba-ca9299b0d7be" providerId="ADAL" clId="{FF542AF4-D00B-4673-B758-E97A0BA79889}"/>
+    <pc:docChg chg="custSel addSld modSld modSection">
+      <pc:chgData name="GINGUENE Franck" userId="6dd02597-da63-4c42-a4ba-ca9299b0d7be" providerId="ADAL" clId="{FF542AF4-D00B-4673-B758-E97A0BA79889}" dt="2023-10-10T19:25:59.117" v="503" actId="20577"/>
+      <pc:docMkLst>
+        <pc:docMk/>
+      </pc:docMkLst>
+      <pc:sldChg chg="modSp mod">
+        <pc:chgData name="GINGUENE Franck" userId="6dd02597-da63-4c42-a4ba-ca9299b0d7be" providerId="ADAL" clId="{FF542AF4-D00B-4673-B758-E97A0BA79889}" dt="2023-10-10T19:11:39.847" v="2" actId="403"/>
+        <pc:sldMkLst>
+          <pc:docMk/>
+          <pc:sldMk cId="58004657" sldId="654"/>
+        </pc:sldMkLst>
+        <pc:spChg chg="mod">
+          <ac:chgData name="GINGUENE Franck" userId="6dd02597-da63-4c42-a4ba-ca9299b0d7be" providerId="ADAL" clId="{FF542AF4-D00B-4673-B758-E97A0BA79889}" dt="2023-10-10T19:11:39.847" v="2" actId="403"/>
+          <ac:spMkLst>
+            <pc:docMk/>
+            <pc:sldMk cId="58004657" sldId="654"/>
+            <ac:spMk id="2" creationId="{31592627-3433-46BD-9012-680976C42775}"/>
+          </ac:spMkLst>
+        </pc:spChg>
+      </pc:sldChg>
+      <pc:sldChg chg="modNotesTx">
+        <pc:chgData name="GINGUENE Franck" userId="6dd02597-da63-4c42-a4ba-ca9299b0d7be" providerId="ADAL" clId="{FF542AF4-D00B-4673-B758-E97A0BA79889}" dt="2023-10-10T19:17:58.492" v="29"/>
+        <pc:sldMkLst>
+          <pc:docMk/>
+          <pc:sldMk cId="547038559" sldId="659"/>
+        </pc:sldMkLst>
+      </pc:sldChg>
+      <pc:sldChg chg="modSp mod">
+        <pc:chgData name="GINGUENE Franck" userId="6dd02597-da63-4c42-a4ba-ca9299b0d7be" providerId="ADAL" clId="{FF542AF4-D00B-4673-B758-E97A0BA79889}" dt="2023-10-10T19:11:59.188" v="28" actId="20577"/>
+        <pc:sldMkLst>
+          <pc:docMk/>
+          <pc:sldMk cId="2208751868" sldId="680"/>
+        </pc:sldMkLst>
+        <pc:spChg chg="mod">
+          <ac:chgData name="GINGUENE Franck" userId="6dd02597-da63-4c42-a4ba-ca9299b0d7be" providerId="ADAL" clId="{FF542AF4-D00B-4673-B758-E97A0BA79889}" dt="2023-10-10T19:11:59.188" v="28" actId="20577"/>
+          <ac:spMkLst>
+            <pc:docMk/>
+            <pc:sldMk cId="2208751868" sldId="680"/>
+            <ac:spMk id="8" creationId="{10A2901B-DB4B-FC01-CE6C-491C8A77CF2E}"/>
+          </ac:spMkLst>
+        </pc:spChg>
+      </pc:sldChg>
+      <pc:sldChg chg="addSp modSp mod">
+        <pc:chgData name="GINGUENE Franck" userId="6dd02597-da63-4c42-a4ba-ca9299b0d7be" providerId="ADAL" clId="{FF542AF4-D00B-4673-B758-E97A0BA79889}" dt="2023-10-10T19:25:59.117" v="503" actId="20577"/>
+        <pc:sldMkLst>
+          <pc:docMk/>
+          <pc:sldMk cId="58728973" sldId="682"/>
+        </pc:sldMkLst>
+        <pc:spChg chg="add mod">
+          <ac:chgData name="GINGUENE Franck" userId="6dd02597-da63-4c42-a4ba-ca9299b0d7be" providerId="ADAL" clId="{FF542AF4-D00B-4673-B758-E97A0BA79889}" dt="2023-10-10T19:25:59.117" v="503" actId="20577"/>
+          <ac:spMkLst>
+            <pc:docMk/>
+            <pc:sldMk cId="58728973" sldId="682"/>
+            <ac:spMk id="3" creationId="{195971A5-526E-F573-DA0F-367961BC7989}"/>
+          </ac:spMkLst>
+        </pc:spChg>
+        <pc:spChg chg="mod">
+          <ac:chgData name="GINGUENE Franck" userId="6dd02597-da63-4c42-a4ba-ca9299b0d7be" providerId="ADAL" clId="{FF542AF4-D00B-4673-B758-E97A0BA79889}" dt="2023-10-10T19:25:47.818" v="485" actId="1076"/>
+          <ac:spMkLst>
+            <pc:docMk/>
+            <pc:sldMk cId="58728973" sldId="682"/>
+            <ac:spMk id="6" creationId="{42284369-820F-E7E0-2617-193F7832F276}"/>
+          </ac:spMkLst>
+        </pc:spChg>
+        <pc:graphicFrameChg chg="mod">
+          <ac:chgData name="GINGUENE Franck" userId="6dd02597-da63-4c42-a4ba-ca9299b0d7be" providerId="ADAL" clId="{FF542AF4-D00B-4673-B758-E97A0BA79889}" dt="2023-10-10T19:25:47.818" v="485" actId="1076"/>
+          <ac:graphicFrameMkLst>
+            <pc:docMk/>
+            <pc:sldMk cId="58728973" sldId="682"/>
+            <ac:graphicFrameMk id="9" creationId="{0873D5BF-40BF-7944-D6C7-A891AF283AD9}"/>
+          </ac:graphicFrameMkLst>
+        </pc:graphicFrameChg>
+      </pc:sldChg>
+      <pc:sldChg chg="modSp new mod">
+        <pc:chgData name="GINGUENE Franck" userId="6dd02597-da63-4c42-a4ba-ca9299b0d7be" providerId="ADAL" clId="{FF542AF4-D00B-4673-B758-E97A0BA79889}" dt="2023-10-10T19:24:25.996" v="484" actId="20577"/>
+        <pc:sldMkLst>
+          <pc:docMk/>
+          <pc:sldMk cId="1718865525" sldId="685"/>
+        </pc:sldMkLst>
+        <pc:spChg chg="mod">
+          <ac:chgData name="GINGUENE Franck" userId="6dd02597-da63-4c42-a4ba-ca9299b0d7be" providerId="ADAL" clId="{FF542AF4-D00B-4673-B758-E97A0BA79889}" dt="2023-10-10T19:18:30.645" v="57" actId="20577"/>
+          <ac:spMkLst>
+            <pc:docMk/>
+            <pc:sldMk cId="1718865525" sldId="685"/>
+            <ac:spMk id="2" creationId="{7FD1FC38-E695-BFEE-224B-54E83EC8F86C}"/>
+          </ac:spMkLst>
+        </pc:spChg>
+        <pc:spChg chg="mod">
+          <ac:chgData name="GINGUENE Franck" userId="6dd02597-da63-4c42-a4ba-ca9299b0d7be" providerId="ADAL" clId="{FF542AF4-D00B-4673-B758-E97A0BA79889}" dt="2023-10-10T19:23:30.981" v="437" actId="1076"/>
+          <ac:spMkLst>
+            <pc:docMk/>
+            <pc:sldMk cId="1718865525" sldId="685"/>
+            <ac:spMk id="3" creationId="{6F93453B-B0CA-8FBB-F22B-9A49D7E0C3DB}"/>
+          </ac:spMkLst>
+        </pc:spChg>
+        <pc:spChg chg="mod">
+          <ac:chgData name="GINGUENE Franck" userId="6dd02597-da63-4c42-a4ba-ca9299b0d7be" providerId="ADAL" clId="{FF542AF4-D00B-4673-B758-E97A0BA79889}" dt="2023-10-10T19:24:25.996" v="484" actId="20577"/>
+          <ac:spMkLst>
+            <pc:docMk/>
+            <pc:sldMk cId="1718865525" sldId="685"/>
+            <ac:spMk id="5" creationId="{97E641E4-9D0B-6D6E-538D-E7077222D66B}"/>
+          </ac:spMkLst>
+        </pc:spChg>
+      </pc:sldChg>
+    </pc:docChg>
+  </pc:docChgLst>
   <pc:docChgLst>
     <pc:chgData name="GINGUENE Franck" userId="6dd02597-da63-4c42-a4ba-ca9299b0d7be" providerId="ADAL" clId="{F1BA8389-3F93-470F-AFA0-F0A8A5BCAADE}"/>
     <pc:docChg chg="undo custSel addSld delSld modSld sldOrd modMainMaster modSection">
@@ -4128,7 +4238,7 @@
           <a:p>
             <a:fld id="{8C9C54F6-0CFE-431C-9026-D85C70C66E9A}" type="datetimeFigureOut">
               <a:rPr lang="fr-FR" smtClean="0"/>
-              <a:t>03/10/2023</a:t>
+              <a:t>10/10/2023</a:t>
             </a:fld>
             <a:endParaRPr lang="fr-FR"/>
           </a:p>
@@ -4293,7 +4403,7 @@
           <a:p>
             <a:fld id="{B4F9E5CE-9595-4A2A-97FD-F8EAC620972F}" type="datetimeFigureOut">
               <a:rPr lang="fr-FR" smtClean="0"/>
-              <a:t>03/10/2023</a:t>
+              <a:t>10/10/2023</a:t>
             </a:fld>
             <a:endParaRPr lang="fr-FR"/>
           </a:p>
@@ -4692,8 +4802,46 @@
           <a:lstStyle/>
           <a:p>
             <a:r>
-              <a:rPr lang="fr-FR"/>
-              <a:t>Pour plusieurs jours</a:t>
+              <a:rPr lang="fr-FR" dirty="0"/>
+              <a:t>COMAREM (</a:t>
+            </a:r>
+            <a:r>
+              <a:rPr lang="fr-FR" dirty="0" err="1"/>
+              <a:t>coeur</a:t>
+            </a:r>
+            <a:r>
+              <a:rPr lang="fr-FR" dirty="0"/>
+              <a:t> de calcul GPU, ombrage radar de la scène 3D), MSV3 (</a:t>
+            </a:r>
+            <a:r>
+              <a:rPr lang="fr-FR" dirty="0" err="1"/>
+              <a:t>coeur</a:t>
+            </a:r>
+            <a:r>
+              <a:rPr lang="fr-FR" dirty="0"/>
+              <a:t> de calcul multi-GPU), ONERA </a:t>
+            </a:r>
+            <a:r>
+              <a:rPr lang="fr-FR" dirty="0" err="1"/>
+              <a:t>Prorasem</a:t>
+            </a:r>
+            <a:r>
+              <a:rPr lang="fr-FR" dirty="0"/>
+              <a:t> (propagation d'onde EM sur GPU)</a:t>
+            </a:r>
+          </a:p>
+          <a:p>
+            <a:r>
+              <a:rPr lang="fr-FR" dirty="0"/>
+              <a:t>IRSN Suite logicielle pour la gestion des urgences nucléaires (Optimisation </a:t>
+            </a:r>
+            <a:r>
+              <a:rPr lang="fr-FR" dirty="0" err="1"/>
+              <a:t>Multi-thread</a:t>
+            </a:r>
+            <a:r>
+              <a:rPr lang="fr-FR" dirty="0"/>
+              <a:t> C++ -&gt; x30 sur toute la suite). et bientôt AURORA (portage et optimisation d'un algo génétique de calcul de trajectoire).</a:t>
             </a:r>
           </a:p>
         </p:txBody>
@@ -4716,6 +4864,93 @@
             <a:fld id="{9CF9D27B-14D3-40C6-9E94-52C99CF5D75D}" type="slidenum">
               <a:rPr lang="fr-FR" smtClean="0"/>
               <a:t>7</a:t>
+            </a:fld>
+            <a:endParaRPr lang="fr-FR"/>
+          </a:p>
+        </p:txBody>
+      </p:sp>
+    </p:spTree>
+    <p:extLst>
+      <p:ext uri="{BB962C8B-B14F-4D97-AF65-F5344CB8AC3E}">
+        <p14:creationId xmlns:p14="http://schemas.microsoft.com/office/powerpoint/2010/main" val="1144970587"/>
+      </p:ext>
+    </p:extLst>
+  </p:cSld>
+  <p:clrMapOvr>
+    <a:masterClrMapping/>
+  </p:clrMapOvr>
+</p:notes>
+</file>
+
+<file path=ppt/notesSlides/notesSlide3.xml><?xml version="1.0" encoding="utf-8"?>
+<p:notes xmlns:a="http://schemas.openxmlformats.org/drawingml/2006/main" xmlns:r="http://schemas.openxmlformats.org/officeDocument/2006/relationships" xmlns:p="http://schemas.openxmlformats.org/presentationml/2006/main">
+  <p:cSld>
+    <p:spTree>
+      <p:nvGrpSpPr>
+        <p:cNvPr id="1" name=""/>
+        <p:cNvGrpSpPr/>
+        <p:nvPr/>
+      </p:nvGrpSpPr>
+      <p:grpSpPr>
+        <a:xfrm>
+          <a:off x="0" y="0"/>
+          <a:ext cx="0" cy="0"/>
+          <a:chOff x="0" y="0"/>
+          <a:chExt cx="0" cy="0"/>
+        </a:xfrm>
+      </p:grpSpPr>
+      <p:sp>
+        <p:nvSpPr>
+          <p:cNvPr id="2" name="Espace réservé de l'image des diapositives 1"/>
+          <p:cNvSpPr>
+            <a:spLocks noGrp="1" noRot="1" noChangeAspect="1"/>
+          </p:cNvSpPr>
+          <p:nvPr>
+            <p:ph type="sldImg"/>
+          </p:nvPr>
+        </p:nvSpPr>
+        <p:spPr/>
+      </p:sp>
+      <p:sp>
+        <p:nvSpPr>
+          <p:cNvPr id="3" name="Espace réservé des notes 2"/>
+          <p:cNvSpPr>
+            <a:spLocks noGrp="1"/>
+          </p:cNvSpPr>
+          <p:nvPr>
+            <p:ph type="body" idx="1"/>
+          </p:nvPr>
+        </p:nvSpPr>
+        <p:spPr/>
+        <p:txBody>
+          <a:bodyPr/>
+          <a:lstStyle/>
+          <a:p>
+            <a:r>
+              <a:rPr lang="fr-FR"/>
+              <a:t>Pour plusieurs jours</a:t>
+            </a:r>
+          </a:p>
+        </p:txBody>
+      </p:sp>
+      <p:sp>
+        <p:nvSpPr>
+          <p:cNvPr id="4" name="Espace réservé du numéro de diapositive 3"/>
+          <p:cNvSpPr>
+            <a:spLocks noGrp="1"/>
+          </p:cNvSpPr>
+          <p:nvPr>
+            <p:ph type="sldNum" sz="quarter" idx="5"/>
+          </p:nvPr>
+        </p:nvSpPr>
+        <p:spPr/>
+        <p:txBody>
+          <a:bodyPr/>
+          <a:lstStyle/>
+          <a:p>
+            <a:fld id="{9CF9D27B-14D3-40C6-9E94-52C99CF5D75D}" type="slidenum">
+              <a:rPr lang="fr-FR" smtClean="0"/>
+              <a:t>8</a:t>
             </a:fld>
             <a:endParaRPr lang="fr-FR"/>
           </a:p>
@@ -19785,7 +20020,7 @@
           </a:ln>
           <a:extLst>
             <a:ext uri="{C572A759-6A51-4108-AA02-DFA0A04FC94B}">
-              <ma14:wrappingTextBoxFlag xmlns:m="http://schemas.openxmlformats.org/officeDocument/2006/math" xmlns:a14="http://schemas.microsoft.com/office/drawing/2010/main" xmlns:ma14="http://schemas.microsoft.com/office/mac/drawingml/2011/main" xmlns="" val="1"/>
+              <ma14:wrappingTextBoxFlag xmlns="" xmlns:ma14="http://schemas.microsoft.com/office/mac/drawingml/2011/main" xmlns:a14="http://schemas.microsoft.com/office/drawing/2010/main" xmlns:m="http://schemas.openxmlformats.org/officeDocument/2006/math" val="1"/>
             </a:ext>
           </a:extLst>
         </p:spPr>
@@ -20480,14 +20715,14 @@
           <a:lstStyle/>
           <a:p>
             <a:r>
-              <a:rPr lang="fr-FR" sz="3600" dirty="0">
+              <a:rPr lang="fr-FR" sz="4000" dirty="0">
                 <a:solidFill>
                   <a:schemeClr val="bg1"/>
                 </a:solidFill>
               </a:rPr>
               <a:t>HIGH PERFORMANCE COMPUTING</a:t>
             </a:r>
-            <a:endParaRPr lang="fr-FR" dirty="0"/>
+            <a:endParaRPr lang="fr-FR" sz="4000" dirty="0"/>
           </a:p>
         </p:txBody>
       </p:sp>
@@ -20537,6 +20772,77 @@
     <p:extLst>
       <p:ext uri="{BB962C8B-B14F-4D97-AF65-F5344CB8AC3E}">
         <p14:creationId xmlns:p14="http://schemas.microsoft.com/office/powerpoint/2010/main" val="58004657"/>
+      </p:ext>
+    </p:extLst>
+  </p:cSld>
+  <p:clrMapOvr>
+    <a:masterClrMapping/>
+  </p:clrMapOvr>
+</p:sld>
+</file>
+
+<file path=ppt/slides/slide10.xml><?xml version="1.0" encoding="utf-8"?>
+<p:sld xmlns:a="http://schemas.openxmlformats.org/drawingml/2006/main" xmlns:r="http://schemas.openxmlformats.org/officeDocument/2006/relationships" xmlns:p="http://schemas.openxmlformats.org/presentationml/2006/main">
+  <p:cSld>
+    <p:spTree>
+      <p:nvGrpSpPr>
+        <p:cNvPr id="1" name=""/>
+        <p:cNvGrpSpPr/>
+        <p:nvPr/>
+      </p:nvGrpSpPr>
+      <p:grpSpPr>
+        <a:xfrm>
+          <a:off x="0" y="0"/>
+          <a:ext cx="0" cy="0"/>
+          <a:chOff x="0" y="0"/>
+          <a:chExt cx="0" cy="0"/>
+        </a:xfrm>
+      </p:grpSpPr>
+      <p:sp>
+        <p:nvSpPr>
+          <p:cNvPr id="2" name="Titre 1">
+            <a:extLst>
+              <a:ext uri="{FF2B5EF4-FFF2-40B4-BE49-F238E27FC236}">
+                <a16:creationId xmlns:a16="http://schemas.microsoft.com/office/drawing/2014/main" id="{31592627-3433-46BD-9012-680976C42775}"/>
+              </a:ext>
+            </a:extLst>
+          </p:cNvPr>
+          <p:cNvSpPr>
+            <a:spLocks noGrp="1"/>
+          </p:cNvSpPr>
+          <p:nvPr>
+            <p:ph type="title"/>
+          </p:nvPr>
+        </p:nvSpPr>
+        <p:spPr>
+          <a:xfrm>
+            <a:off x="7596051" y="4991762"/>
+            <a:ext cx="7633062" cy="968956"/>
+          </a:xfrm>
+        </p:spPr>
+        <p:txBody>
+          <a:bodyPr/>
+          <a:lstStyle/>
+          <a:p>
+            <a:r>
+              <a:rPr lang="fr-FR" sz="4800" dirty="0">
+                <a:solidFill>
+                  <a:schemeClr val="bg1"/>
+                </a:solidFill>
+              </a:rPr>
+              <a:t>PRÊT.E.S ?</a:t>
+            </a:r>
+            <a:endParaRPr lang="fr-FR" sz="4800" dirty="0"/>
+          </a:p>
+        </p:txBody>
+      </p:sp>
+    </p:spTree>
+    <p:custDataLst>
+      <p:tags r:id="rId1"/>
+    </p:custDataLst>
+    <p:extLst>
+      <p:ext uri="{BB962C8B-B14F-4D97-AF65-F5344CB8AC3E}">
+        <p14:creationId xmlns:p14="http://schemas.microsoft.com/office/powerpoint/2010/main" val="1898014714"/>
       </p:ext>
     </p:extLst>
   </p:cSld>
@@ -21830,8 +22136,8 @@
         </p:nvSpPr>
         <p:spPr>
           <a:xfrm>
-            <a:off x="-88777" y="0"/>
-            <a:ext cx="12280777" cy="6858000"/>
+            <a:off x="0" y="0"/>
+            <a:ext cx="12192000" cy="6858000"/>
           </a:xfrm>
           <a:prstGeom prst="rect">
             <a:avLst/>
@@ -21866,6 +22172,13 @@
             <a:r>
               <a:rPr lang="fr-FR" sz="7200" dirty="0"/>
               <a:t>RÉPONDRE À VOS QUESTIONS</a:t>
+            </a:r>
+            <a:br>
+              <a:rPr lang="fr-FR" sz="7200" dirty="0"/>
+            </a:br>
+            <a:r>
+              <a:rPr lang="fr-FR" sz="7200" dirty="0"/>
+              <a:t>ET ECHANGER</a:t>
             </a:r>
           </a:p>
         </p:txBody>
@@ -22610,6 +22923,200 @@
           <p:cNvPr id="2" name="Titre 1">
             <a:extLst>
               <a:ext uri="{FF2B5EF4-FFF2-40B4-BE49-F238E27FC236}">
+                <a16:creationId xmlns:a16="http://schemas.microsoft.com/office/drawing/2014/main" id="{7FD1FC38-E695-BFEE-224B-54E83EC8F86C}"/>
+              </a:ext>
+            </a:extLst>
+          </p:cNvPr>
+          <p:cNvSpPr>
+            <a:spLocks noGrp="1"/>
+          </p:cNvSpPr>
+          <p:nvPr>
+            <p:ph type="title"/>
+          </p:nvPr>
+        </p:nvSpPr>
+        <p:spPr/>
+        <p:txBody>
+          <a:bodyPr/>
+          <a:lstStyle/>
+          <a:p>
+            <a:r>
+              <a:rPr lang="fr-FR" dirty="0"/>
+              <a:t>ANTI-SOMMAIRE</a:t>
+            </a:r>
+          </a:p>
+        </p:txBody>
+      </p:sp>
+      <p:sp>
+        <p:nvSpPr>
+          <p:cNvPr id="3" name="Espace réservé du texte 2">
+            <a:extLst>
+              <a:ext uri="{FF2B5EF4-FFF2-40B4-BE49-F238E27FC236}">
+                <a16:creationId xmlns:a16="http://schemas.microsoft.com/office/drawing/2014/main" id="{6F93453B-B0CA-8FBB-F22B-9A49D7E0C3DB}"/>
+              </a:ext>
+            </a:extLst>
+          </p:cNvPr>
+          <p:cNvSpPr>
+            <a:spLocks noGrp="1"/>
+          </p:cNvSpPr>
+          <p:nvPr>
+            <p:ph type="body" sz="quarter" idx="10"/>
+          </p:nvPr>
+        </p:nvSpPr>
+        <p:spPr>
+          <a:xfrm>
+            <a:off x="8012523" y="1681805"/>
+            <a:ext cx="5100637" cy="392243"/>
+          </a:xfrm>
+        </p:spPr>
+        <p:txBody>
+          <a:bodyPr/>
+          <a:lstStyle/>
+          <a:p>
+            <a:r>
+              <a:rPr lang="fr-FR" dirty="0"/>
+              <a:t>Nous ne verrons pas</a:t>
+            </a:r>
+          </a:p>
+        </p:txBody>
+      </p:sp>
+      <p:sp>
+        <p:nvSpPr>
+          <p:cNvPr id="4" name="Espace réservé du texte 3">
+            <a:extLst>
+              <a:ext uri="{FF2B5EF4-FFF2-40B4-BE49-F238E27FC236}">
+                <a16:creationId xmlns:a16="http://schemas.microsoft.com/office/drawing/2014/main" id="{D7F0BCD9-8CBB-2969-EF9E-4D39055197B9}"/>
+              </a:ext>
+            </a:extLst>
+          </p:cNvPr>
+          <p:cNvSpPr>
+            <a:spLocks noGrp="1"/>
+          </p:cNvSpPr>
+          <p:nvPr>
+            <p:ph type="body" sz="quarter" idx="12"/>
+          </p:nvPr>
+        </p:nvSpPr>
+        <p:spPr/>
+        <p:txBody>
+          <a:bodyPr/>
+          <a:lstStyle/>
+          <a:p>
+            <a:endParaRPr lang="fr-FR"/>
+          </a:p>
+        </p:txBody>
+      </p:sp>
+      <p:sp>
+        <p:nvSpPr>
+          <p:cNvPr id="5" name="Espace réservé du contenu 4">
+            <a:extLst>
+              <a:ext uri="{FF2B5EF4-FFF2-40B4-BE49-F238E27FC236}">
+                <a16:creationId xmlns:a16="http://schemas.microsoft.com/office/drawing/2014/main" id="{97E641E4-9D0B-6D6E-538D-E7077222D66B}"/>
+              </a:ext>
+            </a:extLst>
+          </p:cNvPr>
+          <p:cNvSpPr>
+            <a:spLocks noGrp="1"/>
+          </p:cNvSpPr>
+          <p:nvPr>
+            <p:ph sz="quarter" idx="13"/>
+          </p:nvPr>
+        </p:nvSpPr>
+        <p:spPr>
+          <a:xfrm>
+            <a:off x="6573479" y="2287645"/>
+            <a:ext cx="5162550" cy="5035126"/>
+          </a:xfrm>
+        </p:spPr>
+        <p:txBody>
+          <a:bodyPr/>
+          <a:lstStyle/>
+          <a:p>
+            <a:r>
+              <a:rPr lang="fr-FR" dirty="0"/>
+              <a:t>Le Big Data et les protocoles de transfert en général</a:t>
+            </a:r>
+          </a:p>
+          <a:p>
+            <a:r>
+              <a:rPr lang="fr-FR" dirty="0"/>
+              <a:t>Les problématiques spécifiques liées à l’IA</a:t>
+            </a:r>
+          </a:p>
+          <a:p>
+            <a:r>
+              <a:rPr lang="fr-FR" dirty="0"/>
+              <a:t>Le calcul distribué (avec MPI par exemple)</a:t>
+            </a:r>
+          </a:p>
+          <a:p>
+            <a:r>
+              <a:rPr lang="fr-FR" dirty="0"/>
+              <a:t>L’administration d’un cluster</a:t>
+            </a:r>
+          </a:p>
+          <a:p>
+            <a:r>
+              <a:rPr lang="fr-FR" dirty="0"/>
+              <a:t>Comment utiliser un cloud HPC</a:t>
+            </a:r>
+          </a:p>
+          <a:p>
+            <a:r>
+              <a:rPr lang="fr-FR" dirty="0"/>
+              <a:t>Les capacités HPC du Python</a:t>
+            </a:r>
+          </a:p>
+          <a:p>
+            <a:r>
+              <a:rPr lang="fr-FR" dirty="0"/>
+              <a:t>Le HPC embarqué (FPGA …)</a:t>
+            </a:r>
+          </a:p>
+          <a:p>
+            <a:r>
+              <a:rPr lang="fr-FR" dirty="0"/>
+              <a:t>Comment faire des algos HPC quantiques</a:t>
+            </a:r>
+          </a:p>
+          <a:p>
+            <a:endParaRPr lang="fr-FR" dirty="0"/>
+          </a:p>
+        </p:txBody>
+      </p:sp>
+    </p:spTree>
+    <p:extLst>
+      <p:ext uri="{BB962C8B-B14F-4D97-AF65-F5344CB8AC3E}">
+        <p14:creationId xmlns:p14="http://schemas.microsoft.com/office/powerpoint/2010/main" val="1718865525"/>
+      </p:ext>
+    </p:extLst>
+  </p:cSld>
+  <p:clrMapOvr>
+    <a:masterClrMapping/>
+  </p:clrMapOvr>
+</p:sld>
+</file>
+
+<file path=ppt/slides/slide6.xml><?xml version="1.0" encoding="utf-8"?>
+<p:sld xmlns:a="http://schemas.openxmlformats.org/drawingml/2006/main" xmlns:r="http://schemas.openxmlformats.org/officeDocument/2006/relationships" xmlns:p="http://schemas.openxmlformats.org/presentationml/2006/main">
+  <p:cSld>
+    <p:spTree>
+      <p:nvGrpSpPr>
+        <p:cNvPr id="1" name=""/>
+        <p:cNvGrpSpPr/>
+        <p:nvPr/>
+      </p:nvGrpSpPr>
+      <p:grpSpPr>
+        <a:xfrm>
+          <a:off x="0" y="0"/>
+          <a:ext cx="0" cy="0"/>
+          <a:chOff x="0" y="0"/>
+          <a:chExt cx="0" cy="0"/>
+        </a:xfrm>
+      </p:grpSpPr>
+      <p:sp>
+        <p:nvSpPr>
+          <p:cNvPr id="2" name="Titre 1">
+            <a:extLst>
+              <a:ext uri="{FF2B5EF4-FFF2-40B4-BE49-F238E27FC236}">
                 <a16:creationId xmlns:a16="http://schemas.microsoft.com/office/drawing/2014/main" id="{445C6A22-A22F-427F-A460-1AEEC736B171}"/>
               </a:ext>
             </a:extLst>
@@ -23245,7 +23752,7 @@
 </p:sld>
 </file>
 
-<file path=ppt/slides/slide6.xml><?xml version="1.0" encoding="utf-8"?>
+<file path=ppt/slides/slide7.xml><?xml version="1.0" encoding="utf-8"?>
 <p:sld xmlns:a="http://schemas.openxmlformats.org/drawingml/2006/main" xmlns:r="http://schemas.openxmlformats.org/officeDocument/2006/relationships" xmlns:p="http://schemas.openxmlformats.org/presentationml/2006/main">
   <p:cSld>
     <p:spTree>
@@ -23277,7 +23784,7 @@
           <p:nvPr/>
         </p:nvPicPr>
         <p:blipFill rotWithShape="1">
-          <a:blip r:embed="rId3" cstate="email">
+          <a:blip r:embed="rId4" cstate="email">
             <a:extLst>
               <a:ext uri="{28A0092B-C50C-407E-A947-70E740481C1C}">
                 <a14:useLocalDpi xmlns:a14="http://schemas.microsoft.com/office/drawing/2010/main"/>
@@ -23393,7 +23900,7 @@
           <p:nvPr/>
         </p:nvPicPr>
         <p:blipFill rotWithShape="1">
-          <a:blip r:embed="rId4" cstate="email">
+          <a:blip r:embed="rId5" cstate="email">
             <a:extLst>
               <a:ext uri="{28A0092B-C50C-407E-A947-70E740481C1C}">
                 <a14:useLocalDpi xmlns:a14="http://schemas.microsoft.com/office/drawing/2010/main"/>
@@ -23438,7 +23945,7 @@
           <p:nvPr/>
         </p:nvPicPr>
         <p:blipFill rotWithShape="1">
-          <a:blip r:embed="rId5" cstate="email">
+          <a:blip r:embed="rId6" cstate="email">
             <a:extLst>
               <a:ext uri="{28A0092B-C50C-407E-A947-70E740481C1C}">
                 <a14:useLocalDpi xmlns:a14="http://schemas.microsoft.com/office/drawing/2010/main"/>
@@ -23847,7 +24354,7 @@
             <a:pPr algn="ctr"/>
             <a:r>
               <a:rPr lang="fr-FR" sz="2400" dirty="0">
-                <a:hlinkClick r:id="rId6"/>
+                <a:hlinkClick r:id="rId7"/>
               </a:rPr>
               <a:t>Quelles sont vos attentes ?</a:t>
             </a:r>
@@ -23871,7 +24378,7 @@
 </p:sld>
 </file>
 
-<file path=ppt/slides/slide7.xml><?xml version="1.0" encoding="utf-8"?>
+<file path=ppt/slides/slide8.xml><?xml version="1.0" encoding="utf-8"?>
 <p:sld xmlns:a="http://schemas.openxmlformats.org/drawingml/2006/main" xmlns:r="http://schemas.openxmlformats.org/officeDocument/2006/relationships" xmlns:p="http://schemas.openxmlformats.org/presentationml/2006/main">
   <p:cSld>
     <p:spTree>
@@ -24580,7 +25087,7 @@
 </p:sld>
 </file>
 
-<file path=ppt/slides/slide8.xml><?xml version="1.0" encoding="utf-8"?>
+<file path=ppt/slides/slide9.xml><?xml version="1.0" encoding="utf-8"?>
 <p:sld xmlns:a="http://schemas.openxmlformats.org/drawingml/2006/main" xmlns:r="http://schemas.openxmlformats.org/officeDocument/2006/relationships" xmlns:p="http://schemas.openxmlformats.org/presentationml/2006/main">
   <p:cSld>
     <p:spTree>
@@ -24639,7 +25146,7 @@
         </p:nvSpPr>
         <p:spPr>
           <a:xfrm>
-            <a:off x="1658761" y="1918086"/>
+            <a:off x="1658761" y="1337061"/>
             <a:ext cx="8455377" cy="523220"/>
           </a:xfrm>
           <a:prstGeom prst="rect">
@@ -24674,13 +25181,13 @@
           <p:nvPr>
             <p:extLst>
               <p:ext uri="{D42A27DB-BD31-4B8C-83A1-F6EECF244321}">
-                <p14:modId xmlns:p14="http://schemas.microsoft.com/office/powerpoint/2010/main" val="3504810140"/>
+                <p14:modId xmlns:p14="http://schemas.microsoft.com/office/powerpoint/2010/main" val="2822982687"/>
               </p:ext>
             </p:extLst>
           </p:nvPr>
         </p:nvGraphicFramePr>
         <p:xfrm>
-          <a:off x="2706254" y="3103417"/>
+          <a:off x="2706254" y="2522392"/>
           <a:ext cx="6779491" cy="2761673"/>
         </p:xfrm>
         <a:graphic>
@@ -24689,81 +25196,46 @@
           </a:graphicData>
         </a:graphic>
       </p:graphicFrame>
+      <p:sp>
+        <p:nvSpPr>
+          <p:cNvPr id="3" name="ZoneTexte 2">
+            <a:extLst>
+              <a:ext uri="{FF2B5EF4-FFF2-40B4-BE49-F238E27FC236}">
+                <a16:creationId xmlns:a16="http://schemas.microsoft.com/office/drawing/2014/main" id="{195971A5-526E-F573-DA0F-367961BC7989}"/>
+              </a:ext>
+            </a:extLst>
+          </p:cNvPr>
+          <p:cNvSpPr txBox="1"/>
+          <p:nvPr/>
+        </p:nvSpPr>
+        <p:spPr>
+          <a:xfrm>
+            <a:off x="1868310" y="5684566"/>
+            <a:ext cx="8455377" cy="523220"/>
+          </a:xfrm>
+          <a:prstGeom prst="rect">
+            <a:avLst/>
+          </a:prstGeom>
+          <a:noFill/>
+        </p:spPr>
+        <p:txBody>
+          <a:bodyPr wrap="square" rtlCol="0">
+            <a:spAutoFit/>
+          </a:bodyPr>
+          <a:lstStyle/>
+          <a:p>
+            <a:pPr algn="ctr"/>
+            <a:r>
+              <a:rPr lang="fr-FR" sz="2800" dirty="0"/>
+              <a:t>Des questions ?</a:t>
+            </a:r>
+          </a:p>
+        </p:txBody>
+      </p:sp>
     </p:spTree>
     <p:extLst>
       <p:ext uri="{BB962C8B-B14F-4D97-AF65-F5344CB8AC3E}">
         <p14:creationId xmlns:p14="http://schemas.microsoft.com/office/powerpoint/2010/main" val="58728973"/>
-      </p:ext>
-    </p:extLst>
-  </p:cSld>
-  <p:clrMapOvr>
-    <a:masterClrMapping/>
-  </p:clrMapOvr>
-</p:sld>
-</file>
-
-<file path=ppt/slides/slide9.xml><?xml version="1.0" encoding="utf-8"?>
-<p:sld xmlns:a="http://schemas.openxmlformats.org/drawingml/2006/main" xmlns:r="http://schemas.openxmlformats.org/officeDocument/2006/relationships" xmlns:p="http://schemas.openxmlformats.org/presentationml/2006/main">
-  <p:cSld>
-    <p:spTree>
-      <p:nvGrpSpPr>
-        <p:cNvPr id="1" name=""/>
-        <p:cNvGrpSpPr/>
-        <p:nvPr/>
-      </p:nvGrpSpPr>
-      <p:grpSpPr>
-        <a:xfrm>
-          <a:off x="0" y="0"/>
-          <a:ext cx="0" cy="0"/>
-          <a:chOff x="0" y="0"/>
-          <a:chExt cx="0" cy="0"/>
-        </a:xfrm>
-      </p:grpSpPr>
-      <p:sp>
-        <p:nvSpPr>
-          <p:cNvPr id="2" name="Titre 1">
-            <a:extLst>
-              <a:ext uri="{FF2B5EF4-FFF2-40B4-BE49-F238E27FC236}">
-                <a16:creationId xmlns:a16="http://schemas.microsoft.com/office/drawing/2014/main" id="{31592627-3433-46BD-9012-680976C42775}"/>
-              </a:ext>
-            </a:extLst>
-          </p:cNvPr>
-          <p:cNvSpPr>
-            <a:spLocks noGrp="1"/>
-          </p:cNvSpPr>
-          <p:nvPr>
-            <p:ph type="title"/>
-          </p:nvPr>
-        </p:nvSpPr>
-        <p:spPr>
-          <a:xfrm>
-            <a:off x="7596051" y="4991762"/>
-            <a:ext cx="7633062" cy="968956"/>
-          </a:xfrm>
-        </p:spPr>
-        <p:txBody>
-          <a:bodyPr/>
-          <a:lstStyle/>
-          <a:p>
-            <a:r>
-              <a:rPr lang="fr-FR" sz="4800" dirty="0">
-                <a:solidFill>
-                  <a:schemeClr val="bg1"/>
-                </a:solidFill>
-              </a:rPr>
-              <a:t>PRÊT.E.S ?</a:t>
-            </a:r>
-            <a:endParaRPr lang="fr-FR" sz="4800" dirty="0"/>
-          </a:p>
-        </p:txBody>
-      </p:sp>
-    </p:spTree>
-    <p:custDataLst>
-      <p:tags r:id="rId1"/>
-    </p:custDataLst>
-    <p:extLst>
-      <p:ext uri="{BB962C8B-B14F-4D97-AF65-F5344CB8AC3E}">
-        <p14:creationId xmlns:p14="http://schemas.microsoft.com/office/powerpoint/2010/main" val="1898014714"/>
       </p:ext>
     </p:extLst>
   </p:cSld>
@@ -25826,6 +26298,18 @@
 </file>
 
 <file path=customXml/item1.xml><?xml version="1.0" encoding="utf-8"?>
+<p:properties xmlns:p="http://schemas.microsoft.com/office/2006/metadata/properties" xmlns:xsi="http://www.w3.org/2001/XMLSchema-instance" xmlns:pc="http://schemas.microsoft.com/office/infopath/2007/PartnerControls">
+  <documentManagement>
+    <TaxCatchAll xmlns="e467f4fc-981a-46ee-a3f6-105e8745dbb7" xsi:nil="true"/>
+    <lcf76f155ced4ddcb4097134ff3c332f xmlns="989c36bf-ee70-45f3-84ed-e00738bcacb4">
+      <Terms xmlns="http://schemas.microsoft.com/office/infopath/2007/PartnerControls"/>
+    </lcf76f155ced4ddcb4097134ff3c332f>
+    <Infos xmlns="989c36bf-ee70-45f3-84ed-e00738bcacb4" xsi:nil="true"/>
+  </documentManagement>
+</p:properties>
+</file>
+
+<file path=customXml/item2.xml><?xml version="1.0" encoding="utf-8"?>
 <ct:contentTypeSchema xmlns:ct="http://schemas.microsoft.com/office/2006/metadata/contentType" xmlns:ma="http://schemas.microsoft.com/office/2006/metadata/properties/metaAttributes" ct:_="" ma:_="" ma:contentTypeName="Document" ma:contentTypeID="0x01010075D347C11D56E3408548CE7978614D77" ma:contentTypeVersion="20" ma:contentTypeDescription="Create a new document." ma:contentTypeScope="" ma:versionID="af3e4a6e44c255259a8b137dbeeecdc3">
   <xsd:schema xmlns:xsd="http://www.w3.org/2001/XMLSchema" xmlns:xs="http://www.w3.org/2001/XMLSchema" xmlns:p="http://schemas.microsoft.com/office/2006/metadata/properties" xmlns:ns2="989c36bf-ee70-45f3-84ed-e00738bcacb4" xmlns:ns3="e467f4fc-981a-46ee-a3f6-105e8745dbb7" targetNamespace="http://schemas.microsoft.com/office/2006/metadata/properties" ma:root="true" ma:fieldsID="11f3d953a40b0a95158fe84e9d0d459e" ns2:_="" ns3:_="">
     <xsd:import namespace="989c36bf-ee70-45f3-84ed-e00738bcacb4"/>
@@ -26076,18 +26560,6 @@
 </ct:contentTypeSchema>
 </file>
 
-<file path=customXml/item2.xml><?xml version="1.0" encoding="utf-8"?>
-<p:properties xmlns:p="http://schemas.microsoft.com/office/2006/metadata/properties" xmlns:xsi="http://www.w3.org/2001/XMLSchema-instance" xmlns:pc="http://schemas.microsoft.com/office/infopath/2007/PartnerControls">
-  <documentManagement>
-    <TaxCatchAll xmlns="e467f4fc-981a-46ee-a3f6-105e8745dbb7" xsi:nil="true"/>
-    <lcf76f155ced4ddcb4097134ff3c332f xmlns="989c36bf-ee70-45f3-84ed-e00738bcacb4">
-      <Terms xmlns="http://schemas.microsoft.com/office/infopath/2007/PartnerControls"/>
-    </lcf76f155ced4ddcb4097134ff3c332f>
-    <Infos xmlns="989c36bf-ee70-45f3-84ed-e00738bcacb4" xsi:nil="true"/>
-  </documentManagement>
-</p:properties>
-</file>
-
 <file path=customXml/item3.xml><?xml version="1.0" encoding="utf-8"?>
 <?mso-contentType ?>
 <FormTemplates xmlns="http://schemas.microsoft.com/sharepoint/v3/contenttype/forms">
@@ -26098,6 +26570,23 @@
 </file>
 
 <file path=customXml/itemProps1.xml><?xml version="1.0" encoding="utf-8"?>
+<ds:datastoreItem xmlns:ds="http://schemas.openxmlformats.org/officeDocument/2006/customXml" ds:itemID="{6CAC9C41-D74A-4BD9-B1CB-92967500DC85}">
+  <ds:schemaRefs>
+    <ds:schemaRef ds:uri="http://schemas.microsoft.com/office/2006/metadata/properties"/>
+    <ds:schemaRef ds:uri="http://purl.org/dc/dcmitype/"/>
+    <ds:schemaRef ds:uri="http://schemas.microsoft.com/office/infopath/2007/PartnerControls"/>
+    <ds:schemaRef ds:uri="http://schemas.microsoft.com/office/2006/documentManagement/types"/>
+    <ds:schemaRef ds:uri="http://schemas.openxmlformats.org/package/2006/metadata/core-properties"/>
+    <ds:schemaRef ds:uri="e467f4fc-981a-46ee-a3f6-105e8745dbb7"/>
+    <ds:schemaRef ds:uri="http://purl.org/dc/terms/"/>
+    <ds:schemaRef ds:uri="989c36bf-ee70-45f3-84ed-e00738bcacb4"/>
+    <ds:schemaRef ds:uri="http://www.w3.org/XML/1998/namespace"/>
+    <ds:schemaRef ds:uri="http://purl.org/dc/elements/1.1/"/>
+  </ds:schemaRefs>
+</ds:datastoreItem>
+</file>
+
+<file path=customXml/itemProps2.xml><?xml version="1.0" encoding="utf-8"?>
 <ds:datastoreItem xmlns:ds="http://schemas.openxmlformats.org/officeDocument/2006/customXml" ds:itemID="{14FBF5EF-1609-4686-9BB4-F991F7720433}">
   <ds:schemaRefs>
     <ds:schemaRef ds:uri="http://schemas.microsoft.com/office/2006/metadata/contentType"/>
@@ -26116,23 +26605,6 @@
 </ds:datastoreItem>
 </file>
 
-<file path=customXml/itemProps2.xml><?xml version="1.0" encoding="utf-8"?>
-<ds:datastoreItem xmlns:ds="http://schemas.openxmlformats.org/officeDocument/2006/customXml" ds:itemID="{6CAC9C41-D74A-4BD9-B1CB-92967500DC85}">
-  <ds:schemaRefs>
-    <ds:schemaRef ds:uri="http://schemas.microsoft.com/office/2006/metadata/properties"/>
-    <ds:schemaRef ds:uri="http://purl.org/dc/dcmitype/"/>
-    <ds:schemaRef ds:uri="http://schemas.microsoft.com/office/infopath/2007/PartnerControls"/>
-    <ds:schemaRef ds:uri="http://schemas.microsoft.com/office/2006/documentManagement/types"/>
-    <ds:schemaRef ds:uri="http://schemas.openxmlformats.org/package/2006/metadata/core-properties"/>
-    <ds:schemaRef ds:uri="e467f4fc-981a-46ee-a3f6-105e8745dbb7"/>
-    <ds:schemaRef ds:uri="http://purl.org/dc/terms/"/>
-    <ds:schemaRef ds:uri="989c36bf-ee70-45f3-84ed-e00738bcacb4"/>
-    <ds:schemaRef ds:uri="http://www.w3.org/XML/1998/namespace"/>
-    <ds:schemaRef ds:uri="http://purl.org/dc/elements/1.1/"/>
-  </ds:schemaRefs>
-</ds:datastoreItem>
-</file>
-
 <file path=customXml/itemProps3.xml><?xml version="1.0" encoding="utf-8"?>
 <ds:datastoreItem xmlns:ds="http://schemas.openxmlformats.org/officeDocument/2006/customXml" ds:itemID="{365829EC-48EA-4E68-8B1B-BC296D702C6F}">
   <ds:schemaRefs>

</xml_diff>